<commit_message>
Code changes, licence and readme
</commit_message>
<xml_diff>
--- a/Documentation/ProjectArchitecture.pptx
+++ b/Documentation/ProjectArchitecture.pptx
@@ -6,6 +6,8 @@
   </p:sldMasterIdLst>
   <p:sldIdLst>
     <p:sldId id="256" r:id="rId2"/>
+    <p:sldId id="257" r:id="rId3"/>
+    <p:sldId id="258" r:id="rId4"/>
   </p:sldIdLst>
   <p:sldSz cx="12192000" cy="6858000"/>
   <p:notesSz cx="6858000" cy="9144000"/>
@@ -3342,7 +3344,10 @@
           <a:bodyPr/>
           <a:lstStyle/>
           <a:p>
-            <a:endParaRPr lang="en-US"/>
+            <a:r>
+              <a:rPr lang="en-US" dirty="0"/>
+              <a:t>Chat Healthy	</a:t>
+            </a:r>
           </a:p>
         </p:txBody>
       </p:sp>
@@ -3367,7 +3372,16 @@
           <a:bodyPr/>
           <a:lstStyle/>
           <a:p>
-            <a:endParaRPr lang="en-US"/>
+            <a:r>
+              <a:rPr lang="en-US" dirty="0"/>
+              <a:t>Phase 1 architecture:</a:t>
+            </a:r>
+          </a:p>
+          <a:p>
+            <a:r>
+              <a:rPr lang="en-US" dirty="0"/>
+              <a:t>Project for LLM engineering course. </a:t>
+            </a:r>
           </a:p>
         </p:txBody>
       </p:sp>
@@ -3375,6 +3389,916 @@
     <p:extLst>
       <p:ext uri="{BB962C8B-B14F-4D97-AF65-F5344CB8AC3E}">
         <p14:creationId xmlns:p14="http://schemas.microsoft.com/office/powerpoint/2010/main" val="2545844308"/>
+      </p:ext>
+    </p:extLst>
+  </p:cSld>
+  <p:clrMapOvr>
+    <a:masterClrMapping/>
+  </p:clrMapOvr>
+</p:sld>
+</file>
+
+<file path=ppt/slides/slide2.xml><?xml version="1.0" encoding="utf-8"?>
+<p:sld xmlns:a="http://schemas.openxmlformats.org/drawingml/2006/main" xmlns:r="http://schemas.openxmlformats.org/officeDocument/2006/relationships" xmlns:p="http://schemas.openxmlformats.org/presentationml/2006/main">
+  <p:cSld>
+    <p:spTree>
+      <p:nvGrpSpPr>
+        <p:cNvPr id="1" name=""/>
+        <p:cNvGrpSpPr/>
+        <p:nvPr/>
+      </p:nvGrpSpPr>
+      <p:grpSpPr>
+        <a:xfrm>
+          <a:off x="0" y="0"/>
+          <a:ext cx="0" cy="0"/>
+          <a:chOff x="0" y="0"/>
+          <a:chExt cx="0" cy="0"/>
+        </a:xfrm>
+      </p:grpSpPr>
+      <p:sp>
+        <p:nvSpPr>
+          <p:cNvPr id="2" name="Title 1">
+            <a:extLst>
+              <a:ext uri="{FF2B5EF4-FFF2-40B4-BE49-F238E27FC236}">
+                <a16:creationId xmlns:a16="http://schemas.microsoft.com/office/drawing/2014/main" id="{A909C5E5-C67A-BC61-A0CC-952D05681612}"/>
+              </a:ext>
+            </a:extLst>
+          </p:cNvPr>
+          <p:cNvSpPr>
+            <a:spLocks noGrp="1"/>
+          </p:cNvSpPr>
+          <p:nvPr>
+            <p:ph type="title"/>
+          </p:nvPr>
+        </p:nvSpPr>
+        <p:spPr/>
+        <p:txBody>
+          <a:bodyPr/>
+          <a:lstStyle/>
+          <a:p>
+            <a:r>
+              <a:rPr lang="en-US" dirty="0"/>
+              <a:t>Overview</a:t>
+            </a:r>
+          </a:p>
+        </p:txBody>
+      </p:sp>
+      <p:sp>
+        <p:nvSpPr>
+          <p:cNvPr id="3" name="Content Placeholder 2">
+            <a:extLst>
+              <a:ext uri="{FF2B5EF4-FFF2-40B4-BE49-F238E27FC236}">
+                <a16:creationId xmlns:a16="http://schemas.microsoft.com/office/drawing/2014/main" id="{5DA7233E-1F99-2285-EC5C-6DFBDC4192AB}"/>
+              </a:ext>
+            </a:extLst>
+          </p:cNvPr>
+          <p:cNvSpPr>
+            <a:spLocks noGrp="1"/>
+          </p:cNvSpPr>
+          <p:nvPr>
+            <p:ph idx="1"/>
+          </p:nvPr>
+        </p:nvSpPr>
+        <p:spPr>
+          <a:xfrm>
+            <a:off x="725466" y="1253331"/>
+            <a:ext cx="10515600" cy="4351338"/>
+          </a:xfrm>
+        </p:spPr>
+        <p:txBody>
+          <a:bodyPr>
+            <a:normAutofit fontScale="55000" lnSpcReduction="20000"/>
+          </a:bodyPr>
+          <a:lstStyle/>
+          <a:p>
+            <a:r>
+              <a:rPr lang="en-US" dirty="0"/>
+              <a:t>This architecture exercises the non agentic aspects of all the lessons from LLM engineering from a Udemy course taught by the master Ed Donner:</a:t>
+            </a:r>
+          </a:p>
+          <a:p>
+            <a:r>
+              <a:rPr lang="en-US" dirty="0"/>
+              <a:t>Goal: Create a model that predicts for healthcare Provider types how many docs exist  that are of the specialty. In any particular county. </a:t>
+            </a:r>
+          </a:p>
+          <a:p>
+            <a:r>
+              <a:rPr lang="en-US" dirty="0"/>
+              <a:t>Scope</a:t>
+            </a:r>
+          </a:p>
+          <a:p>
+            <a:pPr lvl="1"/>
+            <a:r>
+              <a:rPr lang="en-US" dirty="0"/>
+              <a:t>Prepare Total data set and metadata and load it to a Mongo DB</a:t>
+            </a:r>
+          </a:p>
+          <a:p>
+            <a:pPr lvl="1"/>
+            <a:r>
+              <a:rPr lang="en-US" dirty="0"/>
+              <a:t>Prepare data vectors and use them to create:</a:t>
+            </a:r>
+          </a:p>
+          <a:p>
+            <a:pPr lvl="2"/>
+            <a:r>
+              <a:rPr lang="en-US" dirty="0"/>
+              <a:t>Predictive models using Frontier models &amp; open-source models using QLoRA</a:t>
+            </a:r>
+          </a:p>
+          <a:p>
+            <a:pPr lvl="2"/>
+            <a:r>
+              <a:rPr lang="en-US" dirty="0"/>
+              <a:t>Examine the vectors as per some classification schema (services)</a:t>
+            </a:r>
+          </a:p>
+          <a:p>
+            <a:pPr lvl="1"/>
+            <a:r>
+              <a:rPr lang="en-US" dirty="0"/>
+              <a:t>Do various training experiments and show them graphically as accurate by % of deviation from true to find the best model. </a:t>
+            </a:r>
+          </a:p>
+          <a:p>
+            <a:pPr lvl="1"/>
+            <a:r>
+              <a:rPr lang="en-US" dirty="0"/>
+              <a:t>Automate the production of a graph based on the experiments</a:t>
+            </a:r>
+          </a:p>
+          <a:p>
+            <a:pPr lvl="1"/>
+            <a:r>
+              <a:rPr lang="en-US" dirty="0"/>
+              <a:t>Prepare training data</a:t>
+            </a:r>
+          </a:p>
+          <a:p>
+            <a:pPr lvl="1"/>
+            <a:r>
+              <a:rPr lang="en-US" dirty="0"/>
+              <a:t>Display a list of hospitals, clinics, and or docs that can deliver the services. </a:t>
+            </a:r>
+          </a:p>
+          <a:p>
+            <a:pPr lvl="1"/>
+            <a:r>
+              <a:rPr lang="en-US" dirty="0"/>
+              <a:t>Phase II (Out of scope, deliver as project for Agentic AI course)</a:t>
+            </a:r>
+          </a:p>
+          <a:p>
+            <a:pPr lvl="1"/>
+            <a:r>
+              <a:rPr lang="en-US" dirty="0"/>
+              <a:t>Allow a ‘conversational interface’ to  the model so that laymen can interrogate the model across the dimensions of  specialty, and use state, county, or zip as the means to interrogate the model.</a:t>
+            </a:r>
+          </a:p>
+          <a:p>
+            <a:pPr lvl="2"/>
+            <a:r>
+              <a:rPr lang="en-US" dirty="0"/>
+              <a:t>Rely on frontier model to be able to help user get a list of specialties that are of interest to them</a:t>
+            </a:r>
+          </a:p>
+          <a:p>
+            <a:r>
+              <a:rPr lang="en-US" dirty="0"/>
+              <a:t>Environment: Use Modal in so much as possible as the 1 &amp; only environment where the work takes place. Deploy a web service that can run on the internet in a serverless capacity. </a:t>
+            </a:r>
+          </a:p>
+          <a:p>
+            <a:pPr marL="0" indent="0">
+              <a:buNone/>
+            </a:pPr>
+            <a:endParaRPr lang="en-US" dirty="0"/>
+          </a:p>
+          <a:p>
+            <a:pPr lvl="1"/>
+            <a:endParaRPr lang="en-US" dirty="0"/>
+          </a:p>
+          <a:p>
+            <a:pPr lvl="1"/>
+            <a:endParaRPr lang="en-US" dirty="0"/>
+          </a:p>
+          <a:p>
+            <a:endParaRPr lang="en-US" dirty="0"/>
+          </a:p>
+        </p:txBody>
+      </p:sp>
+      <p:sp>
+        <p:nvSpPr>
+          <p:cNvPr id="4" name="TextBox 3">
+            <a:extLst>
+              <a:ext uri="{FF2B5EF4-FFF2-40B4-BE49-F238E27FC236}">
+                <a16:creationId xmlns:a16="http://schemas.microsoft.com/office/drawing/2014/main" id="{CFA0ADAF-CAF4-3508-2482-C1AD9EEA37A0}"/>
+              </a:ext>
+            </a:extLst>
+          </p:cNvPr>
+          <p:cNvSpPr txBox="1"/>
+          <p:nvPr/>
+        </p:nvSpPr>
+        <p:spPr>
+          <a:xfrm>
+            <a:off x="200416" y="6396335"/>
+            <a:ext cx="7992649" cy="461665"/>
+          </a:xfrm>
+          <a:prstGeom prst="rect">
+            <a:avLst/>
+          </a:prstGeom>
+          <a:noFill/>
+        </p:spPr>
+        <p:txBody>
+          <a:bodyPr wrap="square" rtlCol="0">
+            <a:spAutoFit/>
+          </a:bodyPr>
+          <a:lstStyle/>
+          <a:p>
+            <a:r>
+              <a:rPr lang="en-US" sz="1200" dirty="0"/>
+              <a:t>1: I will take the Agentic course next and incorporate agentic aspects to the project and UX within the context of that course</a:t>
+            </a:r>
+          </a:p>
+        </p:txBody>
+      </p:sp>
+    </p:spTree>
+    <p:extLst>
+      <p:ext uri="{BB962C8B-B14F-4D97-AF65-F5344CB8AC3E}">
+        <p14:creationId xmlns:p14="http://schemas.microsoft.com/office/powerpoint/2010/main" val="869620980"/>
+      </p:ext>
+    </p:extLst>
+  </p:cSld>
+  <p:clrMapOvr>
+    <a:masterClrMapping/>
+  </p:clrMapOvr>
+</p:sld>
+</file>
+
+<file path=ppt/slides/slide3.xml><?xml version="1.0" encoding="utf-8"?>
+<p:sld xmlns:a="http://schemas.openxmlformats.org/drawingml/2006/main" xmlns:r="http://schemas.openxmlformats.org/officeDocument/2006/relationships" xmlns:p="http://schemas.openxmlformats.org/presentationml/2006/main">
+  <p:cSld>
+    <p:spTree>
+      <p:nvGrpSpPr>
+        <p:cNvPr id="1" name=""/>
+        <p:cNvGrpSpPr/>
+        <p:nvPr/>
+      </p:nvGrpSpPr>
+      <p:grpSpPr>
+        <a:xfrm>
+          <a:off x="0" y="0"/>
+          <a:ext cx="0" cy="0"/>
+          <a:chOff x="0" y="0"/>
+          <a:chExt cx="0" cy="0"/>
+        </a:xfrm>
+      </p:grpSpPr>
+      <p:sp>
+        <p:nvSpPr>
+          <p:cNvPr id="2" name="Title 1">
+            <a:extLst>
+              <a:ext uri="{FF2B5EF4-FFF2-40B4-BE49-F238E27FC236}">
+                <a16:creationId xmlns:a16="http://schemas.microsoft.com/office/drawing/2014/main" id="{F25B9C94-8FF7-E02B-FE6A-29B8BD9B598F}"/>
+              </a:ext>
+            </a:extLst>
+          </p:cNvPr>
+          <p:cNvSpPr>
+            <a:spLocks noGrp="1"/>
+          </p:cNvSpPr>
+          <p:nvPr>
+            <p:ph type="title"/>
+          </p:nvPr>
+        </p:nvSpPr>
+        <p:spPr/>
+        <p:txBody>
+          <a:bodyPr/>
+          <a:lstStyle/>
+          <a:p>
+            <a:r>
+              <a:rPr lang="en-US" dirty="0"/>
+              <a:t>Core model for interrogation</a:t>
+            </a:r>
+          </a:p>
+        </p:txBody>
+      </p:sp>
+      <p:grpSp>
+        <p:nvGrpSpPr>
+          <p:cNvPr id="8" name="Group 7">
+            <a:extLst>
+              <a:ext uri="{FF2B5EF4-FFF2-40B4-BE49-F238E27FC236}">
+                <a16:creationId xmlns:a16="http://schemas.microsoft.com/office/drawing/2014/main" id="{2D00531B-936D-4FB0-A06B-1E1F90B6159D}"/>
+              </a:ext>
+            </a:extLst>
+          </p:cNvPr>
+          <p:cNvGrpSpPr/>
+          <p:nvPr/>
+        </p:nvGrpSpPr>
+        <p:grpSpPr>
+          <a:xfrm>
+            <a:off x="1014608" y="1690688"/>
+            <a:ext cx="1678488" cy="1628709"/>
+            <a:chOff x="1014608" y="1690688"/>
+            <a:chExt cx="1678488" cy="1628709"/>
+          </a:xfrm>
+        </p:grpSpPr>
+        <p:sp>
+          <p:nvSpPr>
+            <p:cNvPr id="6" name="Rectangle 5">
+              <a:extLst>
+                <a:ext uri="{FF2B5EF4-FFF2-40B4-BE49-F238E27FC236}">
+                  <a16:creationId xmlns:a16="http://schemas.microsoft.com/office/drawing/2014/main" id="{D5ACC21A-E6EF-7DA0-7FF3-37BDD3B89E39}"/>
+                </a:ext>
+              </a:extLst>
+            </p:cNvPr>
+            <p:cNvSpPr/>
+            <p:nvPr/>
+          </p:nvSpPr>
+          <p:spPr>
+            <a:xfrm>
+              <a:off x="1014608" y="1690688"/>
+              <a:ext cx="1678488" cy="413685"/>
+            </a:xfrm>
+            <a:prstGeom prst="rect">
+              <a:avLst/>
+            </a:prstGeom>
+            <a:solidFill>
+              <a:schemeClr val="bg2">
+                <a:lumMod val="90000"/>
+              </a:schemeClr>
+            </a:solidFill>
+          </p:spPr>
+          <p:style>
+            <a:lnRef idx="2">
+              <a:schemeClr val="accent1">
+                <a:shade val="15000"/>
+              </a:schemeClr>
+            </a:lnRef>
+            <a:fillRef idx="1">
+              <a:schemeClr val="accent1"/>
+            </a:fillRef>
+            <a:effectRef idx="0">
+              <a:schemeClr val="accent1"/>
+            </a:effectRef>
+            <a:fontRef idx="minor">
+              <a:schemeClr val="lt1"/>
+            </a:fontRef>
+          </p:style>
+          <p:txBody>
+            <a:bodyPr rtlCol="0" anchor="t"/>
+            <a:lstStyle/>
+            <a:p>
+              <a:pPr algn="ctr"/>
+              <a:r>
+                <a:rPr lang="en-US" b="1" dirty="0">
+                  <a:solidFill>
+                    <a:schemeClr val="tx1"/>
+                  </a:solidFill>
+                </a:rPr>
+                <a:t>Specialty</a:t>
+              </a:r>
+            </a:p>
+          </p:txBody>
+        </p:sp>
+        <p:sp>
+          <p:nvSpPr>
+            <p:cNvPr id="7" name="Rectangle 6">
+              <a:extLst>
+                <a:ext uri="{FF2B5EF4-FFF2-40B4-BE49-F238E27FC236}">
+                  <a16:creationId xmlns:a16="http://schemas.microsoft.com/office/drawing/2014/main" id="{558D1BB3-2192-350C-C90C-4D8C2A5ECBBF}"/>
+                </a:ext>
+              </a:extLst>
+            </p:cNvPr>
+            <p:cNvSpPr/>
+            <p:nvPr/>
+          </p:nvSpPr>
+          <p:spPr>
+            <a:xfrm>
+              <a:off x="1014608" y="2104373"/>
+              <a:ext cx="1678488" cy="1215024"/>
+            </a:xfrm>
+            <a:prstGeom prst="rect">
+              <a:avLst/>
+            </a:prstGeom>
+            <a:solidFill>
+              <a:schemeClr val="bg2">
+                <a:lumMod val="90000"/>
+              </a:schemeClr>
+            </a:solidFill>
+          </p:spPr>
+          <p:style>
+            <a:lnRef idx="2">
+              <a:schemeClr val="accent1">
+                <a:shade val="15000"/>
+              </a:schemeClr>
+            </a:lnRef>
+            <a:fillRef idx="1">
+              <a:schemeClr val="accent1"/>
+            </a:fillRef>
+            <a:effectRef idx="0">
+              <a:schemeClr val="accent1"/>
+            </a:effectRef>
+            <a:fontRef idx="minor">
+              <a:schemeClr val="lt1"/>
+            </a:fontRef>
+          </p:style>
+          <p:txBody>
+            <a:bodyPr rtlCol="0" anchor="t"/>
+            <a:lstStyle/>
+            <a:p>
+              <a:r>
+                <a:rPr lang="en-US" sz="1200" b="1" dirty="0">
+                  <a:solidFill>
+                    <a:schemeClr val="tx1"/>
+                  </a:solidFill>
+                </a:rPr>
+                <a:t>Code (PK)</a:t>
+              </a:r>
+            </a:p>
+            <a:p>
+              <a:r>
+                <a:rPr lang="en-US" sz="1200" b="1" dirty="0">
+                  <a:solidFill>
+                    <a:schemeClr val="tx1"/>
+                  </a:solidFill>
+                </a:rPr>
+                <a:t>Specialization </a:t>
+              </a:r>
+            </a:p>
+            <a:p>
+              <a:r>
+                <a:rPr lang="en-US" sz="1200" b="1" dirty="0">
+                  <a:solidFill>
+                    <a:schemeClr val="tx1"/>
+                  </a:solidFill>
+                </a:rPr>
+                <a:t>Classification</a:t>
+              </a:r>
+            </a:p>
+            <a:p>
+              <a:r>
+                <a:rPr lang="en-US" sz="1200" b="1" dirty="0">
+                  <a:solidFill>
+                    <a:schemeClr val="tx1"/>
+                  </a:solidFill>
+                </a:rPr>
+                <a:t>Grouping</a:t>
+              </a:r>
+            </a:p>
+            <a:p>
+              <a:r>
+                <a:rPr lang="en-US" sz="1200" b="1" dirty="0">
+                  <a:solidFill>
+                    <a:schemeClr val="tx1"/>
+                  </a:solidFill>
+                </a:rPr>
+                <a:t>Description </a:t>
+              </a:r>
+            </a:p>
+            <a:p>
+              <a:endParaRPr lang="en-US" sz="1200" b="1" dirty="0">
+                <a:solidFill>
+                  <a:schemeClr val="tx1"/>
+                </a:solidFill>
+              </a:endParaRPr>
+            </a:p>
+            <a:p>
+              <a:endParaRPr lang="en-US" sz="1200" b="1" dirty="0">
+                <a:solidFill>
+                  <a:schemeClr val="tx1"/>
+                </a:solidFill>
+              </a:endParaRPr>
+            </a:p>
+            <a:p>
+              <a:endParaRPr lang="en-US" sz="1200" b="1" dirty="0">
+                <a:solidFill>
+                  <a:schemeClr val="tx1"/>
+                </a:solidFill>
+              </a:endParaRPr>
+            </a:p>
+          </p:txBody>
+        </p:sp>
+      </p:grpSp>
+      <p:grpSp>
+        <p:nvGrpSpPr>
+          <p:cNvPr id="18" name="Group 17">
+            <a:extLst>
+              <a:ext uri="{FF2B5EF4-FFF2-40B4-BE49-F238E27FC236}">
+                <a16:creationId xmlns:a16="http://schemas.microsoft.com/office/drawing/2014/main" id="{0CDA9506-10C9-6D83-FBD9-298BC55E2520}"/>
+              </a:ext>
+            </a:extLst>
+          </p:cNvPr>
+          <p:cNvGrpSpPr/>
+          <p:nvPr/>
+        </p:nvGrpSpPr>
+        <p:grpSpPr>
+          <a:xfrm>
+            <a:off x="4365218" y="1996219"/>
+            <a:ext cx="1678488" cy="1080603"/>
+            <a:chOff x="4207600" y="1690688"/>
+            <a:chExt cx="1678488" cy="1080603"/>
+          </a:xfrm>
+        </p:grpSpPr>
+        <p:sp>
+          <p:nvSpPr>
+            <p:cNvPr id="11" name="Rectangle 10">
+              <a:extLst>
+                <a:ext uri="{FF2B5EF4-FFF2-40B4-BE49-F238E27FC236}">
+                  <a16:creationId xmlns:a16="http://schemas.microsoft.com/office/drawing/2014/main" id="{7C247C78-C0AD-6C9D-FAC3-4E2778A864BF}"/>
+                </a:ext>
+              </a:extLst>
+            </p:cNvPr>
+            <p:cNvSpPr/>
+            <p:nvPr/>
+          </p:nvSpPr>
+          <p:spPr>
+            <a:xfrm>
+              <a:off x="4207600" y="1690688"/>
+              <a:ext cx="1678488" cy="413685"/>
+            </a:xfrm>
+            <a:prstGeom prst="rect">
+              <a:avLst/>
+            </a:prstGeom>
+            <a:solidFill>
+              <a:srgbClr val="FF0000"/>
+            </a:solidFill>
+          </p:spPr>
+          <p:style>
+            <a:lnRef idx="2">
+              <a:schemeClr val="accent1">
+                <a:shade val="15000"/>
+              </a:schemeClr>
+            </a:lnRef>
+            <a:fillRef idx="1">
+              <a:schemeClr val="accent1"/>
+            </a:fillRef>
+            <a:effectRef idx="0">
+              <a:schemeClr val="accent1"/>
+            </a:effectRef>
+            <a:fontRef idx="minor">
+              <a:schemeClr val="lt1"/>
+            </a:fontRef>
+          </p:style>
+          <p:txBody>
+            <a:bodyPr rtlCol="0" anchor="t"/>
+            <a:lstStyle/>
+            <a:p>
+              <a:pPr algn="ctr"/>
+              <a:r>
+                <a:rPr lang="en-US" b="1" dirty="0">
+                  <a:solidFill>
+                    <a:schemeClr val="tx1"/>
+                  </a:solidFill>
+                </a:rPr>
+                <a:t>Services</a:t>
+              </a:r>
+            </a:p>
+          </p:txBody>
+        </p:sp>
+        <p:sp>
+          <p:nvSpPr>
+            <p:cNvPr id="12" name="Rectangle 11">
+              <a:extLst>
+                <a:ext uri="{FF2B5EF4-FFF2-40B4-BE49-F238E27FC236}">
+                  <a16:creationId xmlns:a16="http://schemas.microsoft.com/office/drawing/2014/main" id="{9722205E-58DC-17E5-252B-B27CB0BB86EC}"/>
+                </a:ext>
+              </a:extLst>
+            </p:cNvPr>
+            <p:cNvSpPr/>
+            <p:nvPr/>
+          </p:nvSpPr>
+          <p:spPr>
+            <a:xfrm>
+              <a:off x="4207600" y="2104373"/>
+              <a:ext cx="1678488" cy="666918"/>
+            </a:xfrm>
+            <a:prstGeom prst="rect">
+              <a:avLst/>
+            </a:prstGeom>
+            <a:solidFill>
+              <a:srgbClr val="FF0000"/>
+            </a:solidFill>
+          </p:spPr>
+          <p:style>
+            <a:lnRef idx="2">
+              <a:schemeClr val="accent1">
+                <a:shade val="15000"/>
+              </a:schemeClr>
+            </a:lnRef>
+            <a:fillRef idx="1">
+              <a:schemeClr val="accent1"/>
+            </a:fillRef>
+            <a:effectRef idx="0">
+              <a:schemeClr val="accent1"/>
+            </a:effectRef>
+            <a:fontRef idx="minor">
+              <a:schemeClr val="lt1"/>
+            </a:fontRef>
+          </p:style>
+          <p:txBody>
+            <a:bodyPr rtlCol="0" anchor="t"/>
+            <a:lstStyle/>
+            <a:p>
+              <a:r>
+                <a:rPr lang="en-US" sz="1200" b="1" dirty="0">
+                  <a:solidFill>
+                    <a:schemeClr val="tx1"/>
+                  </a:solidFill>
+                </a:rPr>
+                <a:t>Service name</a:t>
+              </a:r>
+            </a:p>
+            <a:p>
+              <a:r>
+                <a:rPr lang="en-US" sz="1200" b="1" dirty="0">
+                  <a:solidFill>
+                    <a:schemeClr val="tx1"/>
+                  </a:solidFill>
+                </a:rPr>
+                <a:t>Service Description</a:t>
+              </a:r>
+            </a:p>
+            <a:p>
+              <a:endParaRPr lang="en-US" sz="1200" b="1" dirty="0">
+                <a:solidFill>
+                  <a:schemeClr val="tx1"/>
+                </a:solidFill>
+              </a:endParaRPr>
+            </a:p>
+            <a:p>
+              <a:endParaRPr lang="en-US" sz="1200" b="1" dirty="0">
+                <a:solidFill>
+                  <a:schemeClr val="tx1"/>
+                </a:solidFill>
+              </a:endParaRPr>
+            </a:p>
+          </p:txBody>
+        </p:sp>
+      </p:grpSp>
+      <p:cxnSp>
+        <p:nvCxnSpPr>
+          <p:cNvPr id="14" name="Straight Arrow Connector 13">
+            <a:extLst>
+              <a:ext uri="{FF2B5EF4-FFF2-40B4-BE49-F238E27FC236}">
+                <a16:creationId xmlns:a16="http://schemas.microsoft.com/office/drawing/2014/main" id="{48CB1425-3FD2-6817-E0B3-94474C6E4DD2}"/>
+              </a:ext>
+            </a:extLst>
+          </p:cNvPr>
+          <p:cNvCxnSpPr>
+            <a:cxnSpLocks/>
+            <a:stCxn id="7" idx="3"/>
+            <a:endCxn id="12" idx="1"/>
+          </p:cNvCxnSpPr>
+          <p:nvPr/>
+        </p:nvCxnSpPr>
+        <p:spPr>
+          <a:xfrm>
+            <a:off x="2693096" y="2711885"/>
+            <a:ext cx="1672122" cy="31478"/>
+          </a:xfrm>
+          <a:prstGeom prst="straightConnector1">
+            <a:avLst/>
+          </a:prstGeom>
+          <a:ln>
+            <a:tailEnd type="none"/>
+          </a:ln>
+        </p:spPr>
+        <p:style>
+          <a:lnRef idx="2">
+            <a:schemeClr val="accent1"/>
+          </a:lnRef>
+          <a:fillRef idx="0">
+            <a:schemeClr val="accent1"/>
+          </a:fillRef>
+          <a:effectRef idx="1">
+            <a:schemeClr val="accent1"/>
+          </a:effectRef>
+          <a:fontRef idx="minor">
+            <a:schemeClr val="tx1"/>
+          </a:fontRef>
+        </p:style>
+      </p:cxnSp>
+      <p:sp>
+        <p:nvSpPr>
+          <p:cNvPr id="15" name="TextBox 14">
+            <a:extLst>
+              <a:ext uri="{FF2B5EF4-FFF2-40B4-BE49-F238E27FC236}">
+                <a16:creationId xmlns:a16="http://schemas.microsoft.com/office/drawing/2014/main" id="{7A47C5B3-1A07-BC5D-32B4-8EAB53945D11}"/>
+              </a:ext>
+            </a:extLst>
+          </p:cNvPr>
+          <p:cNvSpPr txBox="1"/>
+          <p:nvPr/>
+        </p:nvSpPr>
+        <p:spPr>
+          <a:xfrm>
+            <a:off x="3827744" y="2401959"/>
+            <a:ext cx="517642" cy="369332"/>
+          </a:xfrm>
+          <a:prstGeom prst="rect">
+            <a:avLst/>
+          </a:prstGeom>
+          <a:noFill/>
+        </p:spPr>
+        <p:txBody>
+          <a:bodyPr wrap="none" rtlCol="0">
+            <a:spAutoFit/>
+          </a:bodyPr>
+          <a:lstStyle/>
+          <a:p>
+            <a:r>
+              <a:rPr lang="en-US" dirty="0"/>
+              <a:t>1..*</a:t>
+            </a:r>
+          </a:p>
+        </p:txBody>
+      </p:sp>
+      <p:sp>
+        <p:nvSpPr>
+          <p:cNvPr id="23" name="Rectangle 22">
+            <a:extLst>
+              <a:ext uri="{FF2B5EF4-FFF2-40B4-BE49-F238E27FC236}">
+                <a16:creationId xmlns:a16="http://schemas.microsoft.com/office/drawing/2014/main" id="{A8A26EE9-982A-8D62-0B87-C4A392681900}"/>
+              </a:ext>
+            </a:extLst>
+          </p:cNvPr>
+          <p:cNvSpPr/>
+          <p:nvPr/>
+        </p:nvSpPr>
+        <p:spPr>
+          <a:xfrm>
+            <a:off x="1129429" y="3673001"/>
+            <a:ext cx="1678488" cy="413685"/>
+          </a:xfrm>
+          <a:prstGeom prst="rect">
+            <a:avLst/>
+          </a:prstGeom>
+          <a:solidFill>
+            <a:schemeClr val="bg2">
+              <a:lumMod val="90000"/>
+            </a:schemeClr>
+          </a:solidFill>
+        </p:spPr>
+        <p:style>
+          <a:lnRef idx="2">
+            <a:schemeClr val="accent1">
+              <a:shade val="15000"/>
+            </a:schemeClr>
+          </a:lnRef>
+          <a:fillRef idx="1">
+            <a:schemeClr val="accent1"/>
+          </a:fillRef>
+          <a:effectRef idx="0">
+            <a:schemeClr val="accent1"/>
+          </a:effectRef>
+          <a:fontRef idx="minor">
+            <a:schemeClr val="lt1"/>
+          </a:fontRef>
+        </p:style>
+        <p:txBody>
+          <a:bodyPr rtlCol="0" anchor="t"/>
+          <a:lstStyle/>
+          <a:p>
+            <a:pPr algn="ctr"/>
+            <a:r>
+              <a:rPr lang="en-US" b="1">
+                <a:solidFill>
+                  <a:schemeClr val="tx1"/>
+                </a:solidFill>
+              </a:rPr>
+              <a:t>Provider</a:t>
+            </a:r>
+            <a:endParaRPr lang="en-US" b="1" dirty="0">
+              <a:solidFill>
+                <a:schemeClr val="tx1"/>
+              </a:solidFill>
+            </a:endParaRPr>
+          </a:p>
+        </p:txBody>
+      </p:sp>
+      <p:sp>
+        <p:nvSpPr>
+          <p:cNvPr id="24" name="Rectangle 23">
+            <a:extLst>
+              <a:ext uri="{FF2B5EF4-FFF2-40B4-BE49-F238E27FC236}">
+                <a16:creationId xmlns:a16="http://schemas.microsoft.com/office/drawing/2014/main" id="{708D400A-BBB8-929A-2151-C5B0A083AED1}"/>
+              </a:ext>
+            </a:extLst>
+          </p:cNvPr>
+          <p:cNvSpPr/>
+          <p:nvPr/>
+        </p:nvSpPr>
+        <p:spPr>
+          <a:xfrm>
+            <a:off x="1129429" y="4086686"/>
+            <a:ext cx="1678488" cy="1215024"/>
+          </a:xfrm>
+          <a:prstGeom prst="rect">
+            <a:avLst/>
+          </a:prstGeom>
+          <a:solidFill>
+            <a:schemeClr val="bg2">
+              <a:lumMod val="90000"/>
+            </a:schemeClr>
+          </a:solidFill>
+        </p:spPr>
+        <p:style>
+          <a:lnRef idx="2">
+            <a:schemeClr val="accent1">
+              <a:shade val="15000"/>
+            </a:schemeClr>
+          </a:lnRef>
+          <a:fillRef idx="1">
+            <a:schemeClr val="accent1"/>
+          </a:fillRef>
+          <a:effectRef idx="0">
+            <a:schemeClr val="accent1"/>
+          </a:effectRef>
+          <a:fontRef idx="minor">
+            <a:schemeClr val="lt1"/>
+          </a:fontRef>
+        </p:style>
+        <p:txBody>
+          <a:bodyPr rtlCol="0" anchor="t"/>
+          <a:lstStyle/>
+          <a:p>
+            <a:r>
+              <a:rPr lang="en-US" sz="1200" b="1" dirty="0">
+                <a:solidFill>
+                  <a:schemeClr val="tx1"/>
+                </a:solidFill>
+              </a:rPr>
+              <a:t>Code (PK)</a:t>
+            </a:r>
+          </a:p>
+          <a:p>
+            <a:r>
+              <a:rPr lang="en-US" sz="1200" b="1" dirty="0">
+                <a:solidFill>
+                  <a:schemeClr val="tx1"/>
+                </a:solidFill>
+              </a:rPr>
+              <a:t>Specialization </a:t>
+            </a:r>
+          </a:p>
+          <a:p>
+            <a:r>
+              <a:rPr lang="en-US" sz="1200" b="1" dirty="0">
+                <a:solidFill>
+                  <a:schemeClr val="tx1"/>
+                </a:solidFill>
+              </a:rPr>
+              <a:t>Classification</a:t>
+            </a:r>
+          </a:p>
+          <a:p>
+            <a:r>
+              <a:rPr lang="en-US" sz="1200" b="1" dirty="0">
+                <a:solidFill>
+                  <a:schemeClr val="tx1"/>
+                </a:solidFill>
+              </a:rPr>
+              <a:t>Grouping</a:t>
+            </a:r>
+          </a:p>
+          <a:p>
+            <a:r>
+              <a:rPr lang="en-US" sz="1200" b="1" dirty="0">
+                <a:solidFill>
+                  <a:schemeClr val="tx1"/>
+                </a:solidFill>
+              </a:rPr>
+              <a:t>Description </a:t>
+            </a:r>
+          </a:p>
+          <a:p>
+            <a:endParaRPr lang="en-US" sz="1200" b="1" dirty="0">
+              <a:solidFill>
+                <a:schemeClr val="tx1"/>
+              </a:solidFill>
+            </a:endParaRPr>
+          </a:p>
+          <a:p>
+            <a:endParaRPr lang="en-US" sz="1200" b="1" dirty="0">
+              <a:solidFill>
+                <a:schemeClr val="tx1"/>
+              </a:solidFill>
+            </a:endParaRPr>
+          </a:p>
+          <a:p>
+            <a:endParaRPr lang="en-US" sz="1200" b="1" dirty="0">
+              <a:solidFill>
+                <a:schemeClr val="tx1"/>
+              </a:solidFill>
+            </a:endParaRPr>
+          </a:p>
+        </p:txBody>
+      </p:sp>
+    </p:spTree>
+    <p:extLst>
+      <p:ext uri="{BB962C8B-B14F-4D97-AF65-F5344CB8AC3E}">
+        <p14:creationId xmlns:p14="http://schemas.microsoft.com/office/powerpoint/2010/main" val="3356390297"/>
       </p:ext>
     </p:extLst>
   </p:cSld>

</xml_diff>